<commit_message>
some changes in presentation and speech
</commit_message>
<xml_diff>
--- a/презентация.pptx
+++ b/презентация.pptx
@@ -124,6 +124,18 @@
 </p:presentation>
 </file>
 
+<file path=ppt/commentAuthors.xml><?xml version="1.0" encoding="utf-8"?>
+<p:cmAuthorLst xmlns:a="http://schemas.openxmlformats.org/drawingml/2006/main" xmlns:r="http://schemas.openxmlformats.org/officeDocument/2006/relationships" xmlns:p="http://schemas.openxmlformats.org/presentationml/2006/main">
+  <p:cmAuthor id="1" name="Ibragim Gabidullin" initials="IG" lastIdx="1" clrIdx="0">
+    <p:extLst>
+      <p:ext uri="{19B8F6BF-5375-455C-9EA6-DF929625EA0E}">
+        <p15:presenceInfo xmlns:p15="http://schemas.microsoft.com/office/powerpoint/2012/main" userId="Ibragim Gabidullin" providerId="None"/>
+      </p:ext>
+    </p:extLst>
+  </p:cmAuthor>
+</p:cmAuthorLst>
+</file>
+
 <file path=ppt/notesMasters/notesMaster1.xml><?xml version="1.0" encoding="utf-8"?>
 <p:notesMaster xmlns:a="http://schemas.openxmlformats.org/drawingml/2006/main" xmlns:r="http://schemas.openxmlformats.org/officeDocument/2006/relationships" xmlns:p="http://schemas.openxmlformats.org/presentationml/2006/main">
   <p:cSld>
@@ -206,7 +218,7 @@
           <a:p>
             <a:fld id="{5D84C3B8-A29B-4FA2-A181-573356ACB1E5}" type="datetimeFigureOut">
               <a:rPr lang="ru-RU" smtClean="0"/>
-              <a:t>14.06.2017</a:t>
+              <a:t>20.06.2017</a:t>
             </a:fld>
             <a:endParaRPr lang="ru-RU"/>
           </a:p>
@@ -518,7 +530,7 @@
           <a:bodyPr/>
           <a:lstStyle/>
           <a:p>
-            <a:endParaRPr lang="ru-RU"/>
+            <a:endParaRPr lang="ru-RU" dirty="0"/>
           </a:p>
         </p:txBody>
       </p:sp>
@@ -549,6 +561,1948 @@
     <p:extLst>
       <p:ext uri="{BB962C8B-B14F-4D97-AF65-F5344CB8AC3E}">
         <p14:creationId xmlns:p14="http://schemas.microsoft.com/office/powerpoint/2010/main" val="1460602761"/>
+      </p:ext>
+    </p:extLst>
+  </p:cSld>
+  <p:clrMapOvr>
+    <a:masterClrMapping/>
+  </p:clrMapOvr>
+</p:notes>
+</file>
+
+<file path=ppt/notesSlides/notesSlide2.xml><?xml version="1.0" encoding="utf-8"?>
+<p:notes xmlns:a="http://schemas.openxmlformats.org/drawingml/2006/main" xmlns:r="http://schemas.openxmlformats.org/officeDocument/2006/relationships" xmlns:p="http://schemas.openxmlformats.org/presentationml/2006/main">
+  <p:cSld>
+    <p:spTree>
+      <p:nvGrpSpPr>
+        <p:cNvPr id="1" name=""/>
+        <p:cNvGrpSpPr/>
+        <p:nvPr/>
+      </p:nvGrpSpPr>
+      <p:grpSpPr>
+        <a:xfrm>
+          <a:off x="0" y="0"/>
+          <a:ext cx="0" cy="0"/>
+          <a:chOff x="0" y="0"/>
+          <a:chExt cx="0" cy="0"/>
+        </a:xfrm>
+      </p:grpSpPr>
+      <p:sp>
+        <p:nvSpPr>
+          <p:cNvPr id="2" name="Slide Image Placeholder 1"/>
+          <p:cNvSpPr>
+            <a:spLocks noGrp="1" noRot="1" noChangeAspect="1"/>
+          </p:cNvSpPr>
+          <p:nvPr>
+            <p:ph type="sldImg"/>
+          </p:nvPr>
+        </p:nvSpPr>
+        <p:spPr/>
+      </p:sp>
+      <p:sp>
+        <p:nvSpPr>
+          <p:cNvPr id="3" name="Notes Placeholder 2"/>
+          <p:cNvSpPr>
+            <a:spLocks noGrp="1"/>
+          </p:cNvSpPr>
+          <p:nvPr>
+            <p:ph type="body" idx="1"/>
+          </p:nvPr>
+        </p:nvSpPr>
+        <p:spPr/>
+        <p:txBody>
+          <a:bodyPr/>
+          <a:lstStyle/>
+          <a:p>
+            <a:pPr marL="0" marR="0" lvl="0" indent="0" algn="l" defTabSz="914400" rtl="0" eaLnBrk="1" fontAlgn="auto" latinLnBrk="0" hangingPunct="1">
+              <a:lnSpc>
+                <a:spcPct val="100000"/>
+              </a:lnSpc>
+              <a:spcBef>
+                <a:spcPts val="0"/>
+              </a:spcBef>
+              <a:spcAft>
+                <a:spcPts val="0"/>
+              </a:spcAft>
+              <a:buClrTx/>
+              <a:buSzTx/>
+              <a:buFontTx/>
+              <a:buNone/>
+              <a:tabLst/>
+              <a:defRPr/>
+            </a:pPr>
+            <a:r>
+              <a:rPr lang="ru-RU" sz="1200" kern="1200" dirty="0" smtClean="0">
+                <a:solidFill>
+                  <a:schemeClr val="tx1"/>
+                </a:solidFill>
+                <a:effectLst/>
+                <a:latin typeface="+mn-lt"/>
+                <a:ea typeface="+mn-ea"/>
+                <a:cs typeface="+mn-cs"/>
+              </a:rPr>
+              <a:t>В настоящее время существует большое количество данных, которые должны подлежать анализу и обработке. Для обработки больших данных используются такая вещь как параллельные вычисления. Данные вычисления выполняются на кластерах. Но для управления ими существующие решения являются либо сложными, либо дорогими. </a:t>
+            </a:r>
+          </a:p>
+          <a:p>
+            <a:endParaRPr lang="ru-RU" dirty="0"/>
+          </a:p>
+        </p:txBody>
+      </p:sp>
+      <p:sp>
+        <p:nvSpPr>
+          <p:cNvPr id="4" name="Slide Number Placeholder 3"/>
+          <p:cNvSpPr>
+            <a:spLocks noGrp="1"/>
+          </p:cNvSpPr>
+          <p:nvPr>
+            <p:ph type="sldNum" sz="quarter" idx="10"/>
+          </p:nvPr>
+        </p:nvSpPr>
+        <p:spPr/>
+        <p:txBody>
+          <a:bodyPr/>
+          <a:lstStyle/>
+          <a:p>
+            <a:fld id="{F57A3BED-6B87-4A01-91AE-83340B7ECA5F}" type="slidenum">
+              <a:rPr lang="ru-RU" smtClean="0"/>
+              <a:t>2</a:t>
+            </a:fld>
+            <a:endParaRPr lang="ru-RU"/>
+          </a:p>
+        </p:txBody>
+      </p:sp>
+    </p:spTree>
+    <p:extLst>
+      <p:ext uri="{BB962C8B-B14F-4D97-AF65-F5344CB8AC3E}">
+        <p14:creationId xmlns:p14="http://schemas.microsoft.com/office/powerpoint/2010/main" val="2657205959"/>
+      </p:ext>
+    </p:extLst>
+  </p:cSld>
+  <p:clrMapOvr>
+    <a:masterClrMapping/>
+  </p:clrMapOvr>
+</p:notes>
+</file>
+
+<file path=ppt/notesSlides/notesSlide3.xml><?xml version="1.0" encoding="utf-8"?>
+<p:notes xmlns:a="http://schemas.openxmlformats.org/drawingml/2006/main" xmlns:r="http://schemas.openxmlformats.org/officeDocument/2006/relationships" xmlns:p="http://schemas.openxmlformats.org/presentationml/2006/main">
+  <p:cSld>
+    <p:spTree>
+      <p:nvGrpSpPr>
+        <p:cNvPr id="1" name=""/>
+        <p:cNvGrpSpPr/>
+        <p:nvPr/>
+      </p:nvGrpSpPr>
+      <p:grpSpPr>
+        <a:xfrm>
+          <a:off x="0" y="0"/>
+          <a:ext cx="0" cy="0"/>
+          <a:chOff x="0" y="0"/>
+          <a:chExt cx="0" cy="0"/>
+        </a:xfrm>
+      </p:grpSpPr>
+      <p:sp>
+        <p:nvSpPr>
+          <p:cNvPr id="2" name="Slide Image Placeholder 1"/>
+          <p:cNvSpPr>
+            <a:spLocks noGrp="1" noRot="1" noChangeAspect="1"/>
+          </p:cNvSpPr>
+          <p:nvPr>
+            <p:ph type="sldImg"/>
+          </p:nvPr>
+        </p:nvSpPr>
+        <p:spPr/>
+      </p:sp>
+      <p:sp>
+        <p:nvSpPr>
+          <p:cNvPr id="3" name="Notes Placeholder 2"/>
+          <p:cNvSpPr>
+            <a:spLocks noGrp="1"/>
+          </p:cNvSpPr>
+          <p:nvPr>
+            <p:ph type="body" idx="1"/>
+          </p:nvPr>
+        </p:nvSpPr>
+        <p:spPr/>
+        <p:txBody>
+          <a:bodyPr/>
+          <a:lstStyle/>
+          <a:p>
+            <a:pPr marL="0" marR="0" lvl="0" indent="0" algn="l" defTabSz="914400" rtl="0" eaLnBrk="1" fontAlgn="auto" latinLnBrk="0" hangingPunct="1">
+              <a:lnSpc>
+                <a:spcPct val="100000"/>
+              </a:lnSpc>
+              <a:spcBef>
+                <a:spcPts val="0"/>
+              </a:spcBef>
+              <a:spcAft>
+                <a:spcPts val="0"/>
+              </a:spcAft>
+              <a:buClrTx/>
+              <a:buSzTx/>
+              <a:buFontTx/>
+              <a:buNone/>
+              <a:tabLst/>
+              <a:defRPr/>
+            </a:pPr>
+            <a:r>
+              <a:rPr lang="ru-RU" sz="1200" kern="1200" dirty="0" smtClean="0">
+                <a:solidFill>
+                  <a:schemeClr val="tx1"/>
+                </a:solidFill>
+                <a:effectLst/>
+                <a:latin typeface="+mn-lt"/>
+                <a:ea typeface="+mn-ea"/>
+                <a:cs typeface="+mn-cs"/>
+              </a:rPr>
+              <a:t>Таким образом, целью моей работы является разработать готовый к развёртыванию и использованию клиент-серверный </a:t>
+            </a:r>
+            <a:r>
+              <a:rPr lang="ru-RU" sz="1200" kern="1200" dirty="0" err="1" smtClean="0">
+                <a:solidFill>
+                  <a:schemeClr val="tx1"/>
+                </a:solidFill>
+                <a:effectLst/>
+                <a:latin typeface="+mn-lt"/>
+                <a:ea typeface="+mn-ea"/>
+                <a:cs typeface="+mn-cs"/>
+              </a:rPr>
+              <a:t>фреймворка</a:t>
+            </a:r>
+            <a:r>
+              <a:rPr lang="ru-RU" sz="1200" kern="1200" dirty="0" smtClean="0">
+                <a:solidFill>
+                  <a:schemeClr val="tx1"/>
+                </a:solidFill>
+                <a:effectLst/>
+                <a:latin typeface="+mn-lt"/>
+                <a:ea typeface="+mn-ea"/>
+                <a:cs typeface="+mn-cs"/>
+              </a:rPr>
+              <a:t> для управлений параллельными вычислениями. Почему </a:t>
+            </a:r>
+            <a:r>
+              <a:rPr lang="ru-RU" sz="1200" kern="1200" dirty="0" err="1" smtClean="0">
+                <a:solidFill>
+                  <a:schemeClr val="tx1"/>
+                </a:solidFill>
+                <a:effectLst/>
+                <a:latin typeface="+mn-lt"/>
+                <a:ea typeface="+mn-ea"/>
+                <a:cs typeface="+mn-cs"/>
+              </a:rPr>
+              <a:t>фреймворк</a:t>
+            </a:r>
+            <a:r>
+              <a:rPr lang="ru-RU" sz="1200" kern="1200" dirty="0" smtClean="0">
+                <a:solidFill>
+                  <a:schemeClr val="tx1"/>
+                </a:solidFill>
+                <a:effectLst/>
+                <a:latin typeface="+mn-lt"/>
+                <a:ea typeface="+mn-ea"/>
+                <a:cs typeface="+mn-cs"/>
+              </a:rPr>
+              <a:t>? Потому что подразумевается, что проект может быть модифицирован для определенных систем. К примеру, в базовом варианте система управляет </a:t>
+            </a:r>
+            <a:r>
+              <a:rPr lang="en-US" sz="1200" kern="1200" dirty="0" smtClean="0">
+                <a:solidFill>
+                  <a:schemeClr val="tx1"/>
+                </a:solidFill>
+                <a:effectLst/>
+                <a:latin typeface="+mn-lt"/>
+                <a:ea typeface="+mn-ea"/>
+                <a:cs typeface="+mn-cs"/>
+              </a:rPr>
+              <a:t>MPI </a:t>
+            </a:r>
+            <a:r>
+              <a:rPr lang="ru-RU" sz="1200" kern="1200" dirty="0" smtClean="0">
+                <a:solidFill>
+                  <a:schemeClr val="tx1"/>
+                </a:solidFill>
+                <a:effectLst/>
+                <a:latin typeface="+mn-lt"/>
+                <a:ea typeface="+mn-ea"/>
+                <a:cs typeface="+mn-cs"/>
+              </a:rPr>
+              <a:t>вычислениями, но при желании можно легко добавить управление другими технологиями параллельных вычислений.</a:t>
+            </a:r>
+          </a:p>
+          <a:p>
+            <a:endParaRPr lang="ru-RU" dirty="0"/>
+          </a:p>
+        </p:txBody>
+      </p:sp>
+      <p:sp>
+        <p:nvSpPr>
+          <p:cNvPr id="4" name="Slide Number Placeholder 3"/>
+          <p:cNvSpPr>
+            <a:spLocks noGrp="1"/>
+          </p:cNvSpPr>
+          <p:nvPr>
+            <p:ph type="sldNum" sz="quarter" idx="10"/>
+          </p:nvPr>
+        </p:nvSpPr>
+        <p:spPr/>
+        <p:txBody>
+          <a:bodyPr/>
+          <a:lstStyle/>
+          <a:p>
+            <a:fld id="{F57A3BED-6B87-4A01-91AE-83340B7ECA5F}" type="slidenum">
+              <a:rPr lang="ru-RU" smtClean="0"/>
+              <a:t>3</a:t>
+            </a:fld>
+            <a:endParaRPr lang="ru-RU"/>
+          </a:p>
+        </p:txBody>
+      </p:sp>
+    </p:spTree>
+    <p:extLst>
+      <p:ext uri="{BB962C8B-B14F-4D97-AF65-F5344CB8AC3E}">
+        <p14:creationId xmlns:p14="http://schemas.microsoft.com/office/powerpoint/2010/main" val="2965518882"/>
+      </p:ext>
+    </p:extLst>
+  </p:cSld>
+  <p:clrMapOvr>
+    <a:masterClrMapping/>
+  </p:clrMapOvr>
+</p:notes>
+</file>
+
+<file path=ppt/notesSlides/notesSlide4.xml><?xml version="1.0" encoding="utf-8"?>
+<p:notes xmlns:a="http://schemas.openxmlformats.org/drawingml/2006/main" xmlns:r="http://schemas.openxmlformats.org/officeDocument/2006/relationships" xmlns:p="http://schemas.openxmlformats.org/presentationml/2006/main">
+  <p:cSld>
+    <p:spTree>
+      <p:nvGrpSpPr>
+        <p:cNvPr id="1" name=""/>
+        <p:cNvGrpSpPr/>
+        <p:nvPr/>
+      </p:nvGrpSpPr>
+      <p:grpSpPr>
+        <a:xfrm>
+          <a:off x="0" y="0"/>
+          <a:ext cx="0" cy="0"/>
+          <a:chOff x="0" y="0"/>
+          <a:chExt cx="0" cy="0"/>
+        </a:xfrm>
+      </p:grpSpPr>
+      <p:sp>
+        <p:nvSpPr>
+          <p:cNvPr id="2" name="Slide Image Placeholder 1"/>
+          <p:cNvSpPr>
+            <a:spLocks noGrp="1" noRot="1" noChangeAspect="1"/>
+          </p:cNvSpPr>
+          <p:nvPr>
+            <p:ph type="sldImg"/>
+          </p:nvPr>
+        </p:nvSpPr>
+        <p:spPr/>
+      </p:sp>
+      <p:sp>
+        <p:nvSpPr>
+          <p:cNvPr id="3" name="Notes Placeholder 2"/>
+          <p:cNvSpPr>
+            <a:spLocks noGrp="1"/>
+          </p:cNvSpPr>
+          <p:nvPr>
+            <p:ph type="body" idx="1"/>
+          </p:nvPr>
+        </p:nvSpPr>
+        <p:spPr/>
+        <p:txBody>
+          <a:bodyPr/>
+          <a:lstStyle/>
+          <a:p>
+            <a:r>
+              <a:rPr lang="ru-RU" sz="1200" kern="1200" dirty="0" smtClean="0">
+                <a:solidFill>
+                  <a:schemeClr val="tx1"/>
+                </a:solidFill>
+                <a:effectLst/>
+                <a:latin typeface="+mn-lt"/>
+                <a:ea typeface="+mn-ea"/>
+                <a:cs typeface="+mn-cs"/>
+              </a:rPr>
+              <a:t>Для достижения цели, я поставил перед собой задачи:</a:t>
+            </a:r>
+          </a:p>
+          <a:p>
+            <a:pPr lvl="0"/>
+            <a:r>
+              <a:rPr lang="ru-RU" sz="1200" kern="1200" dirty="0" smtClean="0">
+                <a:solidFill>
+                  <a:schemeClr val="tx1"/>
+                </a:solidFill>
+                <a:effectLst/>
+                <a:latin typeface="+mn-lt"/>
+                <a:ea typeface="+mn-ea"/>
+                <a:cs typeface="+mn-cs"/>
+              </a:rPr>
+              <a:t>Для того, чтобы знать, чем нужно управлять, мне нужно изучить парадигмы и технологии параллельных вычислений;</a:t>
+            </a:r>
+          </a:p>
+          <a:p>
+            <a:pPr lvl="0"/>
+            <a:r>
+              <a:rPr lang="ru-RU" sz="1200" kern="1200" dirty="0" smtClean="0">
+                <a:solidFill>
+                  <a:schemeClr val="tx1"/>
+                </a:solidFill>
+                <a:effectLst/>
+                <a:latin typeface="+mn-lt"/>
+                <a:ea typeface="+mn-ea"/>
+                <a:cs typeface="+mn-cs"/>
+              </a:rPr>
+              <a:t>Также нужно исследовать существующие системы управления параллельными вычислениями, для того чтобы знать какие системы уже существуют и на что ориентироваться при разработке;</a:t>
+            </a:r>
+          </a:p>
+          <a:p>
+            <a:pPr lvl="0"/>
+            <a:r>
+              <a:rPr lang="ru-RU" sz="1200" kern="1200" dirty="0" smtClean="0">
+                <a:solidFill>
+                  <a:schemeClr val="tx1"/>
+                </a:solidFill>
+                <a:effectLst/>
+                <a:latin typeface="+mn-lt"/>
+                <a:ea typeface="+mn-ea"/>
+                <a:cs typeface="+mn-cs"/>
+              </a:rPr>
+              <a:t>Очевидно, что нужно спроектировать архитектуру </a:t>
+            </a:r>
+            <a:r>
+              <a:rPr lang="ru-RU" sz="1200" kern="1200" dirty="0" err="1" smtClean="0">
+                <a:solidFill>
+                  <a:schemeClr val="tx1"/>
+                </a:solidFill>
+                <a:effectLst/>
+                <a:latin typeface="+mn-lt"/>
+                <a:ea typeface="+mn-ea"/>
+                <a:cs typeface="+mn-cs"/>
+              </a:rPr>
+              <a:t>фреймворка</a:t>
+            </a:r>
+            <a:r>
+              <a:rPr lang="ru-RU" sz="1200" kern="1200" dirty="0" smtClean="0">
+                <a:solidFill>
+                  <a:schemeClr val="tx1"/>
+                </a:solidFill>
+                <a:effectLst/>
+                <a:latin typeface="+mn-lt"/>
+                <a:ea typeface="+mn-ea"/>
+                <a:cs typeface="+mn-cs"/>
+              </a:rPr>
+              <a:t>, клиентской и серверной части. В данном случае в архитектуре важна гибкость и ясность;</a:t>
+            </a:r>
+          </a:p>
+          <a:p>
+            <a:pPr lvl="0"/>
+            <a:r>
+              <a:rPr lang="ru-RU" sz="1200" kern="1200" dirty="0" smtClean="0">
+                <a:solidFill>
+                  <a:schemeClr val="tx1"/>
+                </a:solidFill>
+                <a:effectLst/>
+                <a:latin typeface="+mn-lt"/>
+                <a:ea typeface="+mn-ea"/>
+                <a:cs typeface="+mn-cs"/>
+              </a:rPr>
+              <a:t>После этого приняться за разработать серверную и клиентскую части;</a:t>
+            </a:r>
+          </a:p>
+          <a:p>
+            <a:pPr lvl="0"/>
+            <a:r>
+              <a:rPr lang="ru-RU" sz="1200" kern="1200" dirty="0" smtClean="0">
+                <a:solidFill>
+                  <a:schemeClr val="tx1"/>
+                </a:solidFill>
+                <a:effectLst/>
+                <a:latin typeface="+mn-lt"/>
+                <a:ea typeface="+mn-ea"/>
+                <a:cs typeface="+mn-cs"/>
+              </a:rPr>
+              <a:t>В конце работы нужно исследовать работу </a:t>
+            </a:r>
+            <a:r>
+              <a:rPr lang="ru-RU" sz="1200" kern="1200" dirty="0" err="1" smtClean="0">
+                <a:solidFill>
+                  <a:schemeClr val="tx1"/>
+                </a:solidFill>
+                <a:effectLst/>
+                <a:latin typeface="+mn-lt"/>
+                <a:ea typeface="+mn-ea"/>
+                <a:cs typeface="+mn-cs"/>
+              </a:rPr>
+              <a:t>фреймворка</a:t>
+            </a:r>
+            <a:r>
+              <a:rPr lang="ru-RU" sz="1200" kern="1200" dirty="0" smtClean="0">
+                <a:solidFill>
+                  <a:schemeClr val="tx1"/>
+                </a:solidFill>
+                <a:effectLst/>
+                <a:latin typeface="+mn-lt"/>
+                <a:ea typeface="+mn-ea"/>
+                <a:cs typeface="+mn-cs"/>
+              </a:rPr>
+              <a:t> на разных операционных системах.</a:t>
+            </a:r>
+          </a:p>
+          <a:p>
+            <a:endParaRPr lang="ru-RU" dirty="0"/>
+          </a:p>
+        </p:txBody>
+      </p:sp>
+      <p:sp>
+        <p:nvSpPr>
+          <p:cNvPr id="4" name="Slide Number Placeholder 3"/>
+          <p:cNvSpPr>
+            <a:spLocks noGrp="1"/>
+          </p:cNvSpPr>
+          <p:nvPr>
+            <p:ph type="sldNum" sz="quarter" idx="10"/>
+          </p:nvPr>
+        </p:nvSpPr>
+        <p:spPr/>
+        <p:txBody>
+          <a:bodyPr/>
+          <a:lstStyle/>
+          <a:p>
+            <a:fld id="{F57A3BED-6B87-4A01-91AE-83340B7ECA5F}" type="slidenum">
+              <a:rPr lang="ru-RU" smtClean="0"/>
+              <a:t>4</a:t>
+            </a:fld>
+            <a:endParaRPr lang="ru-RU"/>
+          </a:p>
+        </p:txBody>
+      </p:sp>
+    </p:spTree>
+    <p:extLst>
+      <p:ext uri="{BB962C8B-B14F-4D97-AF65-F5344CB8AC3E}">
+        <p14:creationId xmlns:p14="http://schemas.microsoft.com/office/powerpoint/2010/main" val="3488228811"/>
+      </p:ext>
+    </p:extLst>
+  </p:cSld>
+  <p:clrMapOvr>
+    <a:masterClrMapping/>
+  </p:clrMapOvr>
+</p:notes>
+</file>
+
+<file path=ppt/notesSlides/notesSlide5.xml><?xml version="1.0" encoding="utf-8"?>
+<p:notes xmlns:a="http://schemas.openxmlformats.org/drawingml/2006/main" xmlns:r="http://schemas.openxmlformats.org/officeDocument/2006/relationships" xmlns:p="http://schemas.openxmlformats.org/presentationml/2006/main">
+  <p:cSld>
+    <p:spTree>
+      <p:nvGrpSpPr>
+        <p:cNvPr id="1" name=""/>
+        <p:cNvGrpSpPr/>
+        <p:nvPr/>
+      </p:nvGrpSpPr>
+      <p:grpSpPr>
+        <a:xfrm>
+          <a:off x="0" y="0"/>
+          <a:ext cx="0" cy="0"/>
+          <a:chOff x="0" y="0"/>
+          <a:chExt cx="0" cy="0"/>
+        </a:xfrm>
+      </p:grpSpPr>
+      <p:sp>
+        <p:nvSpPr>
+          <p:cNvPr id="2" name="Slide Image Placeholder 1"/>
+          <p:cNvSpPr>
+            <a:spLocks noGrp="1" noRot="1" noChangeAspect="1"/>
+          </p:cNvSpPr>
+          <p:nvPr>
+            <p:ph type="sldImg"/>
+          </p:nvPr>
+        </p:nvSpPr>
+        <p:spPr/>
+      </p:sp>
+      <p:sp>
+        <p:nvSpPr>
+          <p:cNvPr id="3" name="Notes Placeholder 2"/>
+          <p:cNvSpPr>
+            <a:spLocks noGrp="1"/>
+          </p:cNvSpPr>
+          <p:nvPr>
+            <p:ph type="body" idx="1"/>
+          </p:nvPr>
+        </p:nvSpPr>
+        <p:spPr/>
+        <p:txBody>
+          <a:bodyPr/>
+          <a:lstStyle/>
+          <a:p>
+            <a:r>
+              <a:rPr lang="ru-RU" sz="1200" kern="1200" dirty="0" smtClean="0">
+                <a:solidFill>
+                  <a:schemeClr val="tx1"/>
+                </a:solidFill>
+                <a:effectLst/>
+                <a:latin typeface="+mn-lt"/>
+                <a:ea typeface="+mn-ea"/>
+                <a:cs typeface="+mn-cs"/>
+              </a:rPr>
+              <a:t>Системы управления</a:t>
+            </a:r>
+          </a:p>
+          <a:p>
+            <a:r>
+              <a:rPr lang="ru-RU" sz="1200" kern="1200" dirty="0" smtClean="0">
+                <a:solidFill>
+                  <a:schemeClr val="tx1"/>
+                </a:solidFill>
+                <a:effectLst/>
+                <a:latin typeface="+mn-lt"/>
+                <a:ea typeface="+mn-ea"/>
+                <a:cs typeface="+mn-cs"/>
+              </a:rPr>
+              <a:t>Разниц между системами практически. Все обладают примерно одинаковым функционалом, таким как запуск задачи, остановка, запуск её по времени. Подстройка программы под определенную систему.</a:t>
+            </a:r>
+          </a:p>
+          <a:p>
+            <a:r>
+              <a:rPr lang="ru-RU" sz="1200" kern="1200" dirty="0" smtClean="0">
+                <a:solidFill>
+                  <a:schemeClr val="tx1"/>
+                </a:solidFill>
+                <a:effectLst/>
+                <a:latin typeface="+mn-lt"/>
+                <a:ea typeface="+mn-ea"/>
+                <a:cs typeface="+mn-cs"/>
+              </a:rPr>
+              <a:t>PBS (</a:t>
+            </a:r>
+            <a:r>
+              <a:rPr lang="ru-RU" sz="1200" kern="1200" dirty="0" err="1" smtClean="0">
+                <a:solidFill>
+                  <a:schemeClr val="tx1"/>
+                </a:solidFill>
+                <a:effectLst/>
+                <a:latin typeface="+mn-lt"/>
+                <a:ea typeface="+mn-ea"/>
+                <a:cs typeface="+mn-cs"/>
+              </a:rPr>
+              <a:t>Portable</a:t>
+            </a:r>
+            <a:r>
+              <a:rPr lang="ru-RU" sz="1200" kern="1200" dirty="0" smtClean="0">
+                <a:solidFill>
+                  <a:schemeClr val="tx1"/>
+                </a:solidFill>
+                <a:effectLst/>
+                <a:latin typeface="+mn-lt"/>
+                <a:ea typeface="+mn-ea"/>
+                <a:cs typeface="+mn-cs"/>
+              </a:rPr>
+              <a:t> </a:t>
+            </a:r>
+            <a:r>
+              <a:rPr lang="ru-RU" sz="1200" kern="1200" dirty="0" err="1" smtClean="0">
+                <a:solidFill>
+                  <a:schemeClr val="tx1"/>
+                </a:solidFill>
+                <a:effectLst/>
+                <a:latin typeface="+mn-lt"/>
+                <a:ea typeface="+mn-ea"/>
+                <a:cs typeface="+mn-cs"/>
+              </a:rPr>
+              <a:t>Batch</a:t>
+            </a:r>
+            <a:r>
+              <a:rPr lang="ru-RU" sz="1200" kern="1200" dirty="0" smtClean="0">
+                <a:solidFill>
+                  <a:schemeClr val="tx1"/>
+                </a:solidFill>
+                <a:effectLst/>
+                <a:latin typeface="+mn-lt"/>
+                <a:ea typeface="+mn-ea"/>
+                <a:cs typeface="+mn-cs"/>
+              </a:rPr>
+              <a:t> </a:t>
+            </a:r>
+            <a:r>
+              <a:rPr lang="ru-RU" sz="1200" kern="1200" dirty="0" err="1" smtClean="0">
+                <a:solidFill>
+                  <a:schemeClr val="tx1"/>
+                </a:solidFill>
+                <a:effectLst/>
+                <a:latin typeface="+mn-lt"/>
+                <a:ea typeface="+mn-ea"/>
+                <a:cs typeface="+mn-cs"/>
+              </a:rPr>
+              <a:t>System</a:t>
+            </a:r>
+            <a:r>
+              <a:rPr lang="ru-RU" sz="1200" kern="1200" dirty="0" smtClean="0">
+                <a:solidFill>
+                  <a:schemeClr val="tx1"/>
+                </a:solidFill>
+                <a:effectLst/>
+                <a:latin typeface="+mn-lt"/>
+                <a:ea typeface="+mn-ea"/>
+                <a:cs typeface="+mn-cs"/>
+              </a:rPr>
+              <a:t>) — система управления распределенными вычислениями. Основная функция PBS — запуск вычислительных задач в вычислительной среде по расписанию. </a:t>
+            </a:r>
+          </a:p>
+          <a:p>
+            <a:r>
+              <a:rPr lang="ru-RU" sz="1200" kern="1200" dirty="0" smtClean="0">
+                <a:solidFill>
+                  <a:schemeClr val="tx1"/>
+                </a:solidFill>
+                <a:effectLst/>
+                <a:latin typeface="+mn-lt"/>
+                <a:ea typeface="+mn-ea"/>
+                <a:cs typeface="+mn-cs"/>
+              </a:rPr>
+              <a:t>TORQUE (</a:t>
+            </a:r>
+            <a:r>
+              <a:rPr lang="ru-RU" sz="1200" kern="1200" dirty="0" err="1" smtClean="0">
+                <a:solidFill>
+                  <a:schemeClr val="tx1"/>
+                </a:solidFill>
+                <a:effectLst/>
+                <a:latin typeface="+mn-lt"/>
+                <a:ea typeface="+mn-ea"/>
+                <a:cs typeface="+mn-cs"/>
+              </a:rPr>
+              <a:t>Terascale</a:t>
+            </a:r>
+            <a:r>
+              <a:rPr lang="ru-RU" sz="1200" kern="1200" dirty="0" smtClean="0">
+                <a:solidFill>
+                  <a:schemeClr val="tx1"/>
+                </a:solidFill>
+                <a:effectLst/>
+                <a:latin typeface="+mn-lt"/>
+                <a:ea typeface="+mn-ea"/>
+                <a:cs typeface="+mn-cs"/>
+              </a:rPr>
+              <a:t> </a:t>
+            </a:r>
+            <a:r>
+              <a:rPr lang="ru-RU" sz="1200" kern="1200" dirty="0" err="1" smtClean="0">
+                <a:solidFill>
+                  <a:schemeClr val="tx1"/>
+                </a:solidFill>
+                <a:effectLst/>
+                <a:latin typeface="+mn-lt"/>
+                <a:ea typeface="+mn-ea"/>
+                <a:cs typeface="+mn-cs"/>
+              </a:rPr>
+              <a:t>Open-Source</a:t>
+            </a:r>
+            <a:r>
+              <a:rPr lang="ru-RU" sz="1200" kern="1200" dirty="0" smtClean="0">
+                <a:solidFill>
+                  <a:schemeClr val="tx1"/>
+                </a:solidFill>
+                <a:effectLst/>
+                <a:latin typeface="+mn-lt"/>
+                <a:ea typeface="+mn-ea"/>
+                <a:cs typeface="+mn-cs"/>
+              </a:rPr>
+              <a:t> </a:t>
+            </a:r>
+            <a:r>
+              <a:rPr lang="ru-RU" sz="1200" kern="1200" dirty="0" err="1" smtClean="0">
+                <a:solidFill>
+                  <a:schemeClr val="tx1"/>
+                </a:solidFill>
+                <a:effectLst/>
+                <a:latin typeface="+mn-lt"/>
+                <a:ea typeface="+mn-ea"/>
+                <a:cs typeface="+mn-cs"/>
+              </a:rPr>
+              <a:t>Resource</a:t>
+            </a:r>
+            <a:r>
+              <a:rPr lang="ru-RU" sz="1200" kern="1200" dirty="0" smtClean="0">
+                <a:solidFill>
+                  <a:schemeClr val="tx1"/>
+                </a:solidFill>
+                <a:effectLst/>
+                <a:latin typeface="+mn-lt"/>
+                <a:ea typeface="+mn-ea"/>
+                <a:cs typeface="+mn-cs"/>
+              </a:rPr>
+              <a:t> </a:t>
+            </a:r>
+            <a:r>
+              <a:rPr lang="ru-RU" sz="1200" kern="1200" dirty="0" err="1" smtClean="0">
+                <a:solidFill>
+                  <a:schemeClr val="tx1"/>
+                </a:solidFill>
+                <a:effectLst/>
+                <a:latin typeface="+mn-lt"/>
+                <a:ea typeface="+mn-ea"/>
+                <a:cs typeface="+mn-cs"/>
+              </a:rPr>
+              <a:t>and</a:t>
+            </a:r>
+            <a:r>
+              <a:rPr lang="ru-RU" sz="1200" kern="1200" dirty="0" smtClean="0">
+                <a:solidFill>
+                  <a:schemeClr val="tx1"/>
+                </a:solidFill>
+                <a:effectLst/>
+                <a:latin typeface="+mn-lt"/>
+                <a:ea typeface="+mn-ea"/>
+                <a:cs typeface="+mn-cs"/>
+              </a:rPr>
+              <a:t> </a:t>
+            </a:r>
+            <a:r>
+              <a:rPr lang="ru-RU" sz="1200" kern="1200" dirty="0" err="1" smtClean="0">
+                <a:solidFill>
+                  <a:schemeClr val="tx1"/>
+                </a:solidFill>
+                <a:effectLst/>
+                <a:latin typeface="+mn-lt"/>
+                <a:ea typeface="+mn-ea"/>
+                <a:cs typeface="+mn-cs"/>
+              </a:rPr>
+              <a:t>QUEue</a:t>
+            </a:r>
+            <a:r>
+              <a:rPr lang="ru-RU" sz="1200" kern="1200" dirty="0" smtClean="0">
+                <a:solidFill>
+                  <a:schemeClr val="tx1"/>
+                </a:solidFill>
+                <a:effectLst/>
+                <a:latin typeface="+mn-lt"/>
+                <a:ea typeface="+mn-ea"/>
+                <a:cs typeface="+mn-cs"/>
+              </a:rPr>
+              <a:t> </a:t>
+            </a:r>
+            <a:r>
+              <a:rPr lang="ru-RU" sz="1200" kern="1200" dirty="0" err="1" smtClean="0">
+                <a:solidFill>
+                  <a:schemeClr val="tx1"/>
+                </a:solidFill>
+                <a:effectLst/>
+                <a:latin typeface="+mn-lt"/>
+                <a:ea typeface="+mn-ea"/>
+                <a:cs typeface="+mn-cs"/>
+              </a:rPr>
+              <a:t>Manager</a:t>
+            </a:r>
+            <a:r>
+              <a:rPr lang="ru-RU" sz="1200" kern="1200" dirty="0" smtClean="0">
+                <a:solidFill>
+                  <a:schemeClr val="tx1"/>
+                </a:solidFill>
+                <a:effectLst/>
+                <a:latin typeface="+mn-lt"/>
+                <a:ea typeface="+mn-ea"/>
+                <a:cs typeface="+mn-cs"/>
+              </a:rPr>
+              <a:t>) — менеджер </a:t>
+            </a:r>
+            <a:r>
+              <a:rPr lang="ru-RU" sz="1200" u="sng" kern="1200" dirty="0" smtClean="0">
+                <a:solidFill>
+                  <a:schemeClr val="tx1"/>
+                </a:solidFill>
+                <a:effectLst/>
+                <a:latin typeface="+mn-lt"/>
+                <a:ea typeface="+mn-ea"/>
+                <a:cs typeface="+mn-cs"/>
+                <a:hlinkClick r:id="rId3" tooltip="Распределённые системы"/>
+              </a:rPr>
+              <a:t>распределенных ресурсов</a:t>
+            </a:r>
+            <a:r>
+              <a:rPr lang="ru-RU" sz="1200" kern="1200" dirty="0" smtClean="0">
+                <a:solidFill>
+                  <a:schemeClr val="tx1"/>
+                </a:solidFill>
+                <a:effectLst/>
+                <a:latin typeface="+mn-lt"/>
+                <a:ea typeface="+mn-ea"/>
+                <a:cs typeface="+mn-cs"/>
+              </a:rPr>
+              <a:t> для вычислительных </a:t>
+            </a:r>
+            <a:r>
+              <a:rPr lang="ru-RU" sz="1200" u="sng" kern="1200" dirty="0" smtClean="0">
+                <a:solidFill>
+                  <a:schemeClr val="tx1"/>
+                </a:solidFill>
+                <a:effectLst/>
+                <a:latin typeface="+mn-lt"/>
+                <a:ea typeface="+mn-ea"/>
+                <a:cs typeface="+mn-cs"/>
+                <a:hlinkClick r:id="rId4" tooltip="Кластер (группа компьютеров)"/>
+              </a:rPr>
+              <a:t>кластеров</a:t>
+            </a:r>
+            <a:r>
+              <a:rPr lang="ru-RU" sz="1200" kern="1200" dirty="0" smtClean="0">
+                <a:solidFill>
+                  <a:schemeClr val="tx1"/>
+                </a:solidFill>
+                <a:effectLst/>
+                <a:latin typeface="+mn-lt"/>
+                <a:ea typeface="+mn-ea"/>
+                <a:cs typeface="+mn-cs"/>
+              </a:rPr>
+              <a:t> из </a:t>
+            </a:r>
+            <a:r>
+              <a:rPr lang="ru-RU" sz="1200" u="sng" kern="1200" dirty="0" smtClean="0">
+                <a:solidFill>
+                  <a:schemeClr val="tx1"/>
+                </a:solidFill>
+                <a:effectLst/>
+                <a:latin typeface="+mn-lt"/>
+                <a:ea typeface="+mn-ea"/>
+                <a:cs typeface="+mn-cs"/>
+                <a:hlinkClick r:id="rId5" tooltip="Хост"/>
+              </a:rPr>
+              <a:t>машин</a:t>
+            </a:r>
+            <a:r>
+              <a:rPr lang="ru-RU" sz="1200" kern="1200" dirty="0" smtClean="0">
+                <a:solidFill>
+                  <a:schemeClr val="tx1"/>
+                </a:solidFill>
+                <a:effectLst/>
+                <a:latin typeface="+mn-lt"/>
+                <a:ea typeface="+mn-ea"/>
+                <a:cs typeface="+mn-cs"/>
+              </a:rPr>
+              <a:t> под управлением </a:t>
+            </a:r>
+            <a:r>
+              <a:rPr lang="ru-RU" sz="1200" u="sng" kern="1200" dirty="0" err="1" smtClean="0">
+                <a:solidFill>
+                  <a:schemeClr val="tx1"/>
+                </a:solidFill>
+                <a:effectLst/>
+                <a:latin typeface="+mn-lt"/>
+                <a:ea typeface="+mn-ea"/>
+                <a:cs typeface="+mn-cs"/>
+                <a:hlinkClick r:id="rId6" tooltip="Linux"/>
+              </a:rPr>
+              <a:t>Linux</a:t>
+            </a:r>
+            <a:r>
+              <a:rPr lang="ru-RU" sz="1200" kern="1200" dirty="0" smtClean="0">
+                <a:solidFill>
+                  <a:schemeClr val="tx1"/>
+                </a:solidFill>
+                <a:effectLst/>
+                <a:latin typeface="+mn-lt"/>
+                <a:ea typeface="+mn-ea"/>
+                <a:cs typeface="+mn-cs"/>
+              </a:rPr>
+              <a:t> и других </a:t>
+            </a:r>
+            <a:r>
+              <a:rPr lang="ru-RU" sz="1200" u="sng" kern="1200" dirty="0" err="1" smtClean="0">
+                <a:solidFill>
+                  <a:schemeClr val="tx1"/>
+                </a:solidFill>
+                <a:effectLst/>
+                <a:latin typeface="+mn-lt"/>
+                <a:ea typeface="+mn-ea"/>
+                <a:cs typeface="+mn-cs"/>
+                <a:hlinkClick r:id="rId7" tooltip="UNIX-подобная операционная система"/>
+              </a:rPr>
+              <a:t>Unix</a:t>
+            </a:r>
+            <a:r>
+              <a:rPr lang="ru-RU" sz="1200" u="sng" kern="1200" dirty="0" smtClean="0">
+                <a:solidFill>
+                  <a:schemeClr val="tx1"/>
+                </a:solidFill>
+                <a:effectLst/>
+                <a:latin typeface="+mn-lt"/>
+                <a:ea typeface="+mn-ea"/>
+                <a:cs typeface="+mn-cs"/>
+                <a:hlinkClick r:id="rId7" tooltip="UNIX-подобная операционная система"/>
+              </a:rPr>
+              <a:t>-подобных</a:t>
+            </a:r>
+            <a:r>
+              <a:rPr lang="ru-RU" sz="1200" kern="1200" dirty="0" smtClean="0">
+                <a:solidFill>
+                  <a:schemeClr val="tx1"/>
+                </a:solidFill>
+                <a:effectLst/>
+                <a:latin typeface="+mn-lt"/>
+                <a:ea typeface="+mn-ea"/>
+                <a:cs typeface="+mn-cs"/>
+              </a:rPr>
+              <a:t> </a:t>
+            </a:r>
+            <a:r>
+              <a:rPr lang="ru-RU" sz="1200" u="sng" kern="1200" dirty="0" smtClean="0">
+                <a:solidFill>
+                  <a:schemeClr val="tx1"/>
+                </a:solidFill>
+                <a:effectLst/>
+                <a:latin typeface="+mn-lt"/>
+                <a:ea typeface="+mn-ea"/>
+                <a:cs typeface="+mn-cs"/>
+                <a:hlinkClick r:id="rId8" tooltip="Операционная система"/>
+              </a:rPr>
+              <a:t>операционных систем</a:t>
+            </a:r>
+            <a:r>
+              <a:rPr lang="ru-RU" sz="1200" kern="1200" dirty="0" smtClean="0">
+                <a:solidFill>
+                  <a:schemeClr val="tx1"/>
+                </a:solidFill>
+                <a:effectLst/>
+                <a:latin typeface="+mn-lt"/>
+                <a:ea typeface="+mn-ea"/>
+                <a:cs typeface="+mn-cs"/>
+              </a:rPr>
+              <a:t>. Является современной версией </a:t>
+            </a:r>
+            <a:r>
+              <a:rPr lang="en-US" sz="1200" kern="1200" dirty="0" smtClean="0">
+                <a:solidFill>
+                  <a:schemeClr val="tx1"/>
+                </a:solidFill>
+                <a:effectLst/>
+                <a:latin typeface="+mn-lt"/>
+                <a:ea typeface="+mn-ea"/>
+                <a:cs typeface="+mn-cs"/>
+              </a:rPr>
+              <a:t>PBS</a:t>
+            </a:r>
+            <a:r>
+              <a:rPr lang="ru-RU" sz="1200" kern="1200" dirty="0" smtClean="0">
+                <a:solidFill>
+                  <a:schemeClr val="tx1"/>
+                </a:solidFill>
+                <a:effectLst/>
+                <a:latin typeface="+mn-lt"/>
+                <a:ea typeface="+mn-ea"/>
+                <a:cs typeface="+mn-cs"/>
+              </a:rPr>
+              <a:t>. Одна из самых развитых систем управления распределенными вычислениями, поддерживается большим организаций и научных лабораторий.</a:t>
+            </a:r>
+          </a:p>
+          <a:p>
+            <a:r>
+              <a:rPr lang="ru-RU" sz="1200" kern="1200" dirty="0" smtClean="0">
+                <a:solidFill>
+                  <a:schemeClr val="tx1"/>
+                </a:solidFill>
+                <a:effectLst/>
+                <a:latin typeface="+mn-lt"/>
+                <a:ea typeface="+mn-ea"/>
+                <a:cs typeface="+mn-cs"/>
+              </a:rPr>
+              <a:t>В вычислительном кластере на базе Казанского (Приволжского) Федерального университета для управления вычислениями используется такая система как IBM </a:t>
+            </a:r>
+            <a:r>
+              <a:rPr lang="ru-RU" sz="1200" kern="1200" dirty="0" err="1" smtClean="0">
+                <a:solidFill>
+                  <a:schemeClr val="tx1"/>
+                </a:solidFill>
+                <a:effectLst/>
+                <a:latin typeface="+mn-lt"/>
+                <a:ea typeface="+mn-ea"/>
+                <a:cs typeface="+mn-cs"/>
+              </a:rPr>
+              <a:t>Platform</a:t>
+            </a:r>
+            <a:r>
+              <a:rPr lang="ru-RU" sz="1200" kern="1200" dirty="0" smtClean="0">
+                <a:solidFill>
+                  <a:schemeClr val="tx1"/>
+                </a:solidFill>
+                <a:effectLst/>
+                <a:latin typeface="+mn-lt"/>
+                <a:ea typeface="+mn-ea"/>
+                <a:cs typeface="+mn-cs"/>
+              </a:rPr>
+              <a:t> LSF. Данная система является мощной платформой управления нагрузок для распределенных сред высокопроизводительных вычислений. Но имеет несколько минусов, являясь коммерческой и зарубежной разработкой.</a:t>
+            </a:r>
+          </a:p>
+          <a:p>
+            <a:endParaRPr lang="ru-RU" dirty="0"/>
+          </a:p>
+        </p:txBody>
+      </p:sp>
+      <p:sp>
+        <p:nvSpPr>
+          <p:cNvPr id="4" name="Slide Number Placeholder 3"/>
+          <p:cNvSpPr>
+            <a:spLocks noGrp="1"/>
+          </p:cNvSpPr>
+          <p:nvPr>
+            <p:ph type="sldNum" sz="quarter" idx="10"/>
+          </p:nvPr>
+        </p:nvSpPr>
+        <p:spPr/>
+        <p:txBody>
+          <a:bodyPr/>
+          <a:lstStyle/>
+          <a:p>
+            <a:fld id="{F57A3BED-6B87-4A01-91AE-83340B7ECA5F}" type="slidenum">
+              <a:rPr lang="ru-RU" smtClean="0"/>
+              <a:t>5</a:t>
+            </a:fld>
+            <a:endParaRPr lang="ru-RU"/>
+          </a:p>
+        </p:txBody>
+      </p:sp>
+    </p:spTree>
+    <p:extLst>
+      <p:ext uri="{BB962C8B-B14F-4D97-AF65-F5344CB8AC3E}">
+        <p14:creationId xmlns:p14="http://schemas.microsoft.com/office/powerpoint/2010/main" val="1437901004"/>
+      </p:ext>
+    </p:extLst>
+  </p:cSld>
+  <p:clrMapOvr>
+    <a:masterClrMapping/>
+  </p:clrMapOvr>
+</p:notes>
+</file>
+
+<file path=ppt/notesSlides/notesSlide6.xml><?xml version="1.0" encoding="utf-8"?>
+<p:notes xmlns:a="http://schemas.openxmlformats.org/drawingml/2006/main" xmlns:r="http://schemas.openxmlformats.org/officeDocument/2006/relationships" xmlns:p="http://schemas.openxmlformats.org/presentationml/2006/main">
+  <p:cSld>
+    <p:spTree>
+      <p:nvGrpSpPr>
+        <p:cNvPr id="1" name=""/>
+        <p:cNvGrpSpPr/>
+        <p:nvPr/>
+      </p:nvGrpSpPr>
+      <p:grpSpPr>
+        <a:xfrm>
+          <a:off x="0" y="0"/>
+          <a:ext cx="0" cy="0"/>
+          <a:chOff x="0" y="0"/>
+          <a:chExt cx="0" cy="0"/>
+        </a:xfrm>
+      </p:grpSpPr>
+      <p:sp>
+        <p:nvSpPr>
+          <p:cNvPr id="2" name="Slide Image Placeholder 1"/>
+          <p:cNvSpPr>
+            <a:spLocks noGrp="1" noRot="1" noChangeAspect="1"/>
+          </p:cNvSpPr>
+          <p:nvPr>
+            <p:ph type="sldImg"/>
+          </p:nvPr>
+        </p:nvSpPr>
+        <p:spPr/>
+      </p:sp>
+      <p:sp>
+        <p:nvSpPr>
+          <p:cNvPr id="3" name="Notes Placeholder 2"/>
+          <p:cNvSpPr>
+            <a:spLocks noGrp="1"/>
+          </p:cNvSpPr>
+          <p:nvPr>
+            <p:ph type="body" idx="1"/>
+          </p:nvPr>
+        </p:nvSpPr>
+        <p:spPr/>
+        <p:txBody>
+          <a:bodyPr/>
+          <a:lstStyle/>
+          <a:p>
+            <a:pPr marL="0" marR="0" lvl="0" indent="0" algn="l" defTabSz="914400" rtl="0" eaLnBrk="1" fontAlgn="auto" latinLnBrk="0" hangingPunct="1">
+              <a:lnSpc>
+                <a:spcPct val="100000"/>
+              </a:lnSpc>
+              <a:spcBef>
+                <a:spcPts val="0"/>
+              </a:spcBef>
+              <a:spcAft>
+                <a:spcPts val="0"/>
+              </a:spcAft>
+              <a:buClrTx/>
+              <a:buSzTx/>
+              <a:buFontTx/>
+              <a:buNone/>
+              <a:tabLst/>
+              <a:defRPr/>
+            </a:pPr>
+            <a:r>
+              <a:rPr lang="ru-RU" sz="1200" kern="1200" dirty="0" smtClean="0">
+                <a:solidFill>
+                  <a:schemeClr val="tx1"/>
+                </a:solidFill>
+                <a:effectLst/>
+                <a:latin typeface="+mn-lt"/>
+                <a:ea typeface="+mn-ea"/>
+                <a:cs typeface="+mn-cs"/>
+              </a:rPr>
+              <a:t>Проект разделяется на три большие части: клиент, сервер управления и сервис параллельных задач, что вы можете увидеть на картинке. Архитектура довольно классическая, а также простая для модернизации</a:t>
+            </a:r>
+          </a:p>
+          <a:p>
+            <a:endParaRPr lang="ru-RU" dirty="0"/>
+          </a:p>
+        </p:txBody>
+      </p:sp>
+      <p:sp>
+        <p:nvSpPr>
+          <p:cNvPr id="4" name="Slide Number Placeholder 3"/>
+          <p:cNvSpPr>
+            <a:spLocks noGrp="1"/>
+          </p:cNvSpPr>
+          <p:nvPr>
+            <p:ph type="sldNum" sz="quarter" idx="10"/>
+          </p:nvPr>
+        </p:nvSpPr>
+        <p:spPr/>
+        <p:txBody>
+          <a:bodyPr/>
+          <a:lstStyle/>
+          <a:p>
+            <a:fld id="{F57A3BED-6B87-4A01-91AE-83340B7ECA5F}" type="slidenum">
+              <a:rPr lang="ru-RU" smtClean="0"/>
+              <a:t>6</a:t>
+            </a:fld>
+            <a:endParaRPr lang="ru-RU"/>
+          </a:p>
+        </p:txBody>
+      </p:sp>
+    </p:spTree>
+    <p:extLst>
+      <p:ext uri="{BB962C8B-B14F-4D97-AF65-F5344CB8AC3E}">
+        <p14:creationId xmlns:p14="http://schemas.microsoft.com/office/powerpoint/2010/main" val="3551161027"/>
+      </p:ext>
+    </p:extLst>
+  </p:cSld>
+  <p:clrMapOvr>
+    <a:masterClrMapping/>
+  </p:clrMapOvr>
+</p:notes>
+</file>
+
+<file path=ppt/notesSlides/notesSlide7.xml><?xml version="1.0" encoding="utf-8"?>
+<p:notes xmlns:a="http://schemas.openxmlformats.org/drawingml/2006/main" xmlns:r="http://schemas.openxmlformats.org/officeDocument/2006/relationships" xmlns:p="http://schemas.openxmlformats.org/presentationml/2006/main">
+  <p:cSld>
+    <p:spTree>
+      <p:nvGrpSpPr>
+        <p:cNvPr id="1" name=""/>
+        <p:cNvGrpSpPr/>
+        <p:nvPr/>
+      </p:nvGrpSpPr>
+      <p:grpSpPr>
+        <a:xfrm>
+          <a:off x="0" y="0"/>
+          <a:ext cx="0" cy="0"/>
+          <a:chOff x="0" y="0"/>
+          <a:chExt cx="0" cy="0"/>
+        </a:xfrm>
+      </p:grpSpPr>
+      <p:sp>
+        <p:nvSpPr>
+          <p:cNvPr id="2" name="Slide Image Placeholder 1"/>
+          <p:cNvSpPr>
+            <a:spLocks noGrp="1" noRot="1" noChangeAspect="1"/>
+          </p:cNvSpPr>
+          <p:nvPr>
+            <p:ph type="sldImg"/>
+          </p:nvPr>
+        </p:nvSpPr>
+        <p:spPr/>
+      </p:sp>
+      <p:sp>
+        <p:nvSpPr>
+          <p:cNvPr id="3" name="Notes Placeholder 2"/>
+          <p:cNvSpPr>
+            <a:spLocks noGrp="1"/>
+          </p:cNvSpPr>
+          <p:nvPr>
+            <p:ph type="body" idx="1"/>
+          </p:nvPr>
+        </p:nvSpPr>
+        <p:spPr/>
+        <p:txBody>
+          <a:bodyPr/>
+          <a:lstStyle/>
+          <a:p>
+            <a:pPr marL="0" marR="0" lvl="0" indent="0" algn="l" defTabSz="914400" rtl="0" eaLnBrk="1" fontAlgn="auto" latinLnBrk="0" hangingPunct="1">
+              <a:lnSpc>
+                <a:spcPct val="100000"/>
+              </a:lnSpc>
+              <a:spcBef>
+                <a:spcPts val="0"/>
+              </a:spcBef>
+              <a:spcAft>
+                <a:spcPts val="0"/>
+              </a:spcAft>
+              <a:buClrTx/>
+              <a:buSzTx/>
+              <a:buFontTx/>
+              <a:buNone/>
+              <a:tabLst/>
+              <a:defRPr/>
+            </a:pPr>
+            <a:r>
+              <a:rPr lang="ru-RU" sz="1200" kern="1200" dirty="0" smtClean="0">
+                <a:solidFill>
+                  <a:schemeClr val="tx1"/>
+                </a:solidFill>
+                <a:effectLst/>
+                <a:latin typeface="+mn-lt"/>
+                <a:ea typeface="+mn-ea"/>
+                <a:cs typeface="+mn-cs"/>
+              </a:rPr>
+              <a:t>С другой стороны, в проекте используется модель слоёв Мартина </a:t>
+            </a:r>
+            <a:r>
+              <a:rPr lang="ru-RU" sz="1200" kern="1200" dirty="0" err="1" smtClean="0">
+                <a:solidFill>
+                  <a:schemeClr val="tx1"/>
+                </a:solidFill>
+                <a:effectLst/>
+                <a:latin typeface="+mn-lt"/>
+                <a:ea typeface="+mn-ea"/>
+                <a:cs typeface="+mn-cs"/>
+              </a:rPr>
+              <a:t>Фаулера</a:t>
+            </a:r>
+            <a:r>
+              <a:rPr lang="ru-RU" sz="1200" kern="1200" dirty="0" smtClean="0">
+                <a:solidFill>
+                  <a:schemeClr val="tx1"/>
+                </a:solidFill>
+                <a:effectLst/>
+                <a:latin typeface="+mn-lt"/>
+                <a:ea typeface="+mn-ea"/>
+                <a:cs typeface="+mn-cs"/>
+              </a:rPr>
+              <a:t>. Это добавляет читаемости для программиста. Такая структура ограничивает разделяет функции отдельных частей. Данный паттерн часто используемый и большинство программистов с ходу в нём разберутся.</a:t>
+            </a:r>
+          </a:p>
+          <a:p>
+            <a:endParaRPr lang="ru-RU" dirty="0"/>
+          </a:p>
+        </p:txBody>
+      </p:sp>
+      <p:sp>
+        <p:nvSpPr>
+          <p:cNvPr id="4" name="Slide Number Placeholder 3"/>
+          <p:cNvSpPr>
+            <a:spLocks noGrp="1"/>
+          </p:cNvSpPr>
+          <p:nvPr>
+            <p:ph type="sldNum" sz="quarter" idx="10"/>
+          </p:nvPr>
+        </p:nvSpPr>
+        <p:spPr/>
+        <p:txBody>
+          <a:bodyPr/>
+          <a:lstStyle/>
+          <a:p>
+            <a:fld id="{F57A3BED-6B87-4A01-91AE-83340B7ECA5F}" type="slidenum">
+              <a:rPr lang="ru-RU" smtClean="0"/>
+              <a:t>7</a:t>
+            </a:fld>
+            <a:endParaRPr lang="ru-RU"/>
+          </a:p>
+        </p:txBody>
+      </p:sp>
+    </p:spTree>
+    <p:extLst>
+      <p:ext uri="{BB962C8B-B14F-4D97-AF65-F5344CB8AC3E}">
+        <p14:creationId xmlns:p14="http://schemas.microsoft.com/office/powerpoint/2010/main" val="940140561"/>
+      </p:ext>
+    </p:extLst>
+  </p:cSld>
+  <p:clrMapOvr>
+    <a:masterClrMapping/>
+  </p:clrMapOvr>
+</p:notes>
+</file>
+
+<file path=ppt/notesSlides/notesSlide8.xml><?xml version="1.0" encoding="utf-8"?>
+<p:notes xmlns:a="http://schemas.openxmlformats.org/drawingml/2006/main" xmlns:r="http://schemas.openxmlformats.org/officeDocument/2006/relationships" xmlns:p="http://schemas.openxmlformats.org/presentationml/2006/main">
+  <p:cSld>
+    <p:spTree>
+      <p:nvGrpSpPr>
+        <p:cNvPr id="1" name=""/>
+        <p:cNvGrpSpPr/>
+        <p:nvPr/>
+      </p:nvGrpSpPr>
+      <p:grpSpPr>
+        <a:xfrm>
+          <a:off x="0" y="0"/>
+          <a:ext cx="0" cy="0"/>
+          <a:chOff x="0" y="0"/>
+          <a:chExt cx="0" cy="0"/>
+        </a:xfrm>
+      </p:grpSpPr>
+      <p:sp>
+        <p:nvSpPr>
+          <p:cNvPr id="2" name="Slide Image Placeholder 1"/>
+          <p:cNvSpPr>
+            <a:spLocks noGrp="1" noRot="1" noChangeAspect="1"/>
+          </p:cNvSpPr>
+          <p:nvPr>
+            <p:ph type="sldImg"/>
+          </p:nvPr>
+        </p:nvSpPr>
+        <p:spPr/>
+      </p:sp>
+      <p:sp>
+        <p:nvSpPr>
+          <p:cNvPr id="3" name="Notes Placeholder 2"/>
+          <p:cNvSpPr>
+            <a:spLocks noGrp="1"/>
+          </p:cNvSpPr>
+          <p:nvPr>
+            <p:ph type="body" idx="1"/>
+          </p:nvPr>
+        </p:nvSpPr>
+        <p:spPr/>
+        <p:txBody>
+          <a:bodyPr/>
+          <a:lstStyle/>
+          <a:p>
+            <a:r>
+              <a:rPr lang="ru-RU" sz="1200" kern="1200" dirty="0" smtClean="0">
+                <a:solidFill>
+                  <a:schemeClr val="tx1"/>
+                </a:solidFill>
+                <a:effectLst/>
+                <a:latin typeface="+mn-lt"/>
+                <a:ea typeface="+mn-ea"/>
+                <a:cs typeface="+mn-cs"/>
+              </a:rPr>
+              <a:t>В разработке использовались такие технологии как </a:t>
+            </a:r>
+            <a:r>
+              <a:rPr lang="en-US" sz="1200" kern="1200" dirty="0" smtClean="0">
+                <a:solidFill>
+                  <a:schemeClr val="tx1"/>
+                </a:solidFill>
+                <a:effectLst/>
+                <a:latin typeface="+mn-lt"/>
+                <a:ea typeface="+mn-ea"/>
+                <a:cs typeface="+mn-cs"/>
+              </a:rPr>
+              <a:t>C</a:t>
+            </a:r>
+            <a:r>
+              <a:rPr lang="ru-RU" sz="1200" kern="1200" dirty="0" smtClean="0">
+                <a:solidFill>
+                  <a:schemeClr val="tx1"/>
+                </a:solidFill>
+                <a:effectLst/>
+                <a:latin typeface="+mn-lt"/>
+                <a:ea typeface="+mn-ea"/>
+                <a:cs typeface="+mn-cs"/>
+              </a:rPr>
+              <a:t>#, .</a:t>
+            </a:r>
+            <a:r>
+              <a:rPr lang="en-US" sz="1200" kern="1200" dirty="0" smtClean="0">
+                <a:solidFill>
+                  <a:schemeClr val="tx1"/>
+                </a:solidFill>
+                <a:effectLst/>
+                <a:latin typeface="+mn-lt"/>
+                <a:ea typeface="+mn-ea"/>
+                <a:cs typeface="+mn-cs"/>
+              </a:rPr>
+              <a:t>NET Core</a:t>
+            </a:r>
+            <a:r>
+              <a:rPr lang="ru-RU" sz="1200" kern="1200" dirty="0" smtClean="0">
+                <a:solidFill>
+                  <a:schemeClr val="tx1"/>
+                </a:solidFill>
+                <a:effectLst/>
+                <a:latin typeface="+mn-lt"/>
+                <a:ea typeface="+mn-ea"/>
+                <a:cs typeface="+mn-cs"/>
+              </a:rPr>
+              <a:t>, </a:t>
+            </a:r>
+            <a:r>
+              <a:rPr lang="en-US" sz="1200" kern="1200" dirty="0" smtClean="0">
+                <a:solidFill>
+                  <a:schemeClr val="tx1"/>
+                </a:solidFill>
+                <a:effectLst/>
+                <a:latin typeface="+mn-lt"/>
+                <a:ea typeface="+mn-ea"/>
+                <a:cs typeface="+mn-cs"/>
+              </a:rPr>
+              <a:t>Web API</a:t>
+            </a:r>
+            <a:r>
+              <a:rPr lang="ru-RU" sz="1200" kern="1200" dirty="0" smtClean="0">
+                <a:solidFill>
+                  <a:schemeClr val="tx1"/>
+                </a:solidFill>
+                <a:effectLst/>
+                <a:latin typeface="+mn-lt"/>
+                <a:ea typeface="+mn-ea"/>
+                <a:cs typeface="+mn-cs"/>
+              </a:rPr>
+              <a:t>. </a:t>
+            </a:r>
+            <a:r>
+              <a:rPr lang="en-US" sz="1200" kern="1200" dirty="0" smtClean="0">
+                <a:solidFill>
+                  <a:schemeClr val="tx1"/>
+                </a:solidFill>
+                <a:effectLst/>
+                <a:latin typeface="+mn-lt"/>
+                <a:ea typeface="+mn-ea"/>
+                <a:cs typeface="+mn-cs"/>
+              </a:rPr>
+              <a:t>C</a:t>
+            </a:r>
+            <a:r>
+              <a:rPr lang="ru-RU" sz="1200" kern="1200" dirty="0" smtClean="0">
+                <a:solidFill>
+                  <a:schemeClr val="tx1"/>
+                </a:solidFill>
+                <a:effectLst/>
+                <a:latin typeface="+mn-lt"/>
+                <a:ea typeface="+mn-ea"/>
+                <a:cs typeface="+mn-cs"/>
+              </a:rPr>
+              <a:t># один из самых используемых языков в мире, по индексу </a:t>
+            </a:r>
+            <a:r>
+              <a:rPr lang="en-US" sz="1200" kern="1200" dirty="0" smtClean="0">
+                <a:solidFill>
+                  <a:schemeClr val="tx1"/>
+                </a:solidFill>
+                <a:effectLst/>
+                <a:latin typeface="+mn-lt"/>
+                <a:ea typeface="+mn-ea"/>
+                <a:cs typeface="+mn-cs"/>
+              </a:rPr>
+              <a:t>TIOBE </a:t>
+            </a:r>
+            <a:r>
+              <a:rPr lang="ru-RU" sz="1200" kern="1200" dirty="0" smtClean="0">
+                <a:solidFill>
+                  <a:schemeClr val="tx1"/>
+                </a:solidFill>
+                <a:effectLst/>
+                <a:latin typeface="+mn-lt"/>
+                <a:ea typeface="+mn-ea"/>
+                <a:cs typeface="+mn-cs"/>
+              </a:rPr>
+              <a:t>на май 2017 года занимал 5 место. От этого зависит выбор программной платформы для разработки, в данном случае был выбран .</a:t>
+            </a:r>
+            <a:r>
+              <a:rPr lang="en-US" sz="1200" kern="1200" dirty="0" smtClean="0">
+                <a:solidFill>
+                  <a:schemeClr val="tx1"/>
+                </a:solidFill>
+                <a:effectLst/>
+                <a:latin typeface="+mn-lt"/>
+                <a:ea typeface="+mn-ea"/>
+                <a:cs typeface="+mn-cs"/>
+              </a:rPr>
+              <a:t>NET Core</a:t>
+            </a:r>
+            <a:r>
+              <a:rPr lang="ru-RU" sz="1200" kern="1200" dirty="0" smtClean="0">
+                <a:solidFill>
+                  <a:schemeClr val="tx1"/>
+                </a:solidFill>
+                <a:effectLst/>
+                <a:latin typeface="+mn-lt"/>
+                <a:ea typeface="+mn-ea"/>
+                <a:cs typeface="+mn-cs"/>
+              </a:rPr>
+              <a:t>, </a:t>
+            </a:r>
+            <a:r>
+              <a:rPr lang="ru-RU" sz="1200" kern="1200" dirty="0" err="1" smtClean="0">
+                <a:solidFill>
+                  <a:schemeClr val="tx1"/>
+                </a:solidFill>
+                <a:effectLst/>
+                <a:latin typeface="+mn-lt"/>
+                <a:ea typeface="+mn-ea"/>
+                <a:cs typeface="+mn-cs"/>
+              </a:rPr>
+              <a:t>фреймворк</a:t>
+            </a:r>
+            <a:r>
+              <a:rPr lang="ru-RU" sz="1200" kern="1200" dirty="0" smtClean="0">
+                <a:solidFill>
+                  <a:schemeClr val="tx1"/>
+                </a:solidFill>
+                <a:effectLst/>
+                <a:latin typeface="+mn-lt"/>
+                <a:ea typeface="+mn-ea"/>
+                <a:cs typeface="+mn-cs"/>
+              </a:rPr>
+              <a:t> является молодым, но быстроразвивающимся и поддерживает все функции нужные для проекта, таки как </a:t>
+            </a:r>
+            <a:r>
+              <a:rPr lang="en-US" sz="1200" kern="1200" dirty="0" smtClean="0">
+                <a:solidFill>
+                  <a:schemeClr val="tx1"/>
+                </a:solidFill>
+                <a:effectLst/>
+                <a:latin typeface="+mn-lt"/>
+                <a:ea typeface="+mn-ea"/>
+                <a:cs typeface="+mn-cs"/>
+              </a:rPr>
+              <a:t>Web API </a:t>
+            </a:r>
+            <a:r>
+              <a:rPr lang="ru-RU" sz="1200" kern="1200" dirty="0" smtClean="0">
+                <a:solidFill>
+                  <a:schemeClr val="tx1"/>
+                </a:solidFill>
+                <a:effectLst/>
+                <a:latin typeface="+mn-lt"/>
+                <a:ea typeface="+mn-ea"/>
+                <a:cs typeface="+mn-cs"/>
+              </a:rPr>
+              <a:t>для общения между клиентом и сервером.</a:t>
+            </a:r>
+          </a:p>
+          <a:p>
+            <a:r>
+              <a:rPr lang="ru-RU" sz="1200" kern="1200" dirty="0" smtClean="0">
+                <a:solidFill>
+                  <a:schemeClr val="tx1"/>
+                </a:solidFill>
+                <a:effectLst/>
+                <a:latin typeface="+mn-lt"/>
+                <a:ea typeface="+mn-ea"/>
+                <a:cs typeface="+mn-cs"/>
+              </a:rPr>
+              <a:t>	Можно посмотреть на код, здесь менеджеры и </a:t>
+            </a:r>
+            <a:r>
+              <a:rPr lang="ru-RU" sz="1200" kern="1200" dirty="0" err="1" smtClean="0">
+                <a:solidFill>
+                  <a:schemeClr val="tx1"/>
+                </a:solidFill>
+                <a:effectLst/>
+                <a:latin typeface="+mn-lt"/>
+                <a:ea typeface="+mn-ea"/>
+                <a:cs typeface="+mn-cs"/>
+              </a:rPr>
+              <a:t>энджины</a:t>
+            </a:r>
+            <a:r>
+              <a:rPr lang="ru-RU" sz="1200" kern="1200" dirty="0" smtClean="0">
+                <a:solidFill>
+                  <a:schemeClr val="tx1"/>
+                </a:solidFill>
+                <a:effectLst/>
+                <a:latin typeface="+mn-lt"/>
+                <a:ea typeface="+mn-ea"/>
+                <a:cs typeface="+mn-cs"/>
+              </a:rPr>
+              <a:t>.</a:t>
+            </a:r>
+          </a:p>
+          <a:p>
+            <a:endParaRPr lang="ru-RU" dirty="0"/>
+          </a:p>
+        </p:txBody>
+      </p:sp>
+      <p:sp>
+        <p:nvSpPr>
+          <p:cNvPr id="4" name="Slide Number Placeholder 3"/>
+          <p:cNvSpPr>
+            <a:spLocks noGrp="1"/>
+          </p:cNvSpPr>
+          <p:nvPr>
+            <p:ph type="sldNum" sz="quarter" idx="10"/>
+          </p:nvPr>
+        </p:nvSpPr>
+        <p:spPr/>
+        <p:txBody>
+          <a:bodyPr/>
+          <a:lstStyle/>
+          <a:p>
+            <a:fld id="{F57A3BED-6B87-4A01-91AE-83340B7ECA5F}" type="slidenum">
+              <a:rPr lang="ru-RU" smtClean="0"/>
+              <a:t>8</a:t>
+            </a:fld>
+            <a:endParaRPr lang="ru-RU"/>
+          </a:p>
+        </p:txBody>
+      </p:sp>
+    </p:spTree>
+    <p:extLst>
+      <p:ext uri="{BB962C8B-B14F-4D97-AF65-F5344CB8AC3E}">
+        <p14:creationId xmlns:p14="http://schemas.microsoft.com/office/powerpoint/2010/main" val="3860578399"/>
+      </p:ext>
+    </p:extLst>
+  </p:cSld>
+  <p:clrMapOvr>
+    <a:masterClrMapping/>
+  </p:clrMapOvr>
+</p:notes>
+</file>
+
+<file path=ppt/notesSlides/notesSlide9.xml><?xml version="1.0" encoding="utf-8"?>
+<p:notes xmlns:a="http://schemas.openxmlformats.org/drawingml/2006/main" xmlns:r="http://schemas.openxmlformats.org/officeDocument/2006/relationships" xmlns:p="http://schemas.openxmlformats.org/presentationml/2006/main">
+  <p:cSld>
+    <p:spTree>
+      <p:nvGrpSpPr>
+        <p:cNvPr id="1" name=""/>
+        <p:cNvGrpSpPr/>
+        <p:nvPr/>
+      </p:nvGrpSpPr>
+      <p:grpSpPr>
+        <a:xfrm>
+          <a:off x="0" y="0"/>
+          <a:ext cx="0" cy="0"/>
+          <a:chOff x="0" y="0"/>
+          <a:chExt cx="0" cy="0"/>
+        </a:xfrm>
+      </p:grpSpPr>
+      <p:sp>
+        <p:nvSpPr>
+          <p:cNvPr id="2" name="Slide Image Placeholder 1"/>
+          <p:cNvSpPr>
+            <a:spLocks noGrp="1" noRot="1" noChangeAspect="1"/>
+          </p:cNvSpPr>
+          <p:nvPr>
+            <p:ph type="sldImg"/>
+          </p:nvPr>
+        </p:nvSpPr>
+        <p:spPr/>
+      </p:sp>
+      <p:sp>
+        <p:nvSpPr>
+          <p:cNvPr id="3" name="Notes Placeholder 2"/>
+          <p:cNvSpPr>
+            <a:spLocks noGrp="1"/>
+          </p:cNvSpPr>
+          <p:nvPr>
+            <p:ph type="body" idx="1"/>
+          </p:nvPr>
+        </p:nvSpPr>
+        <p:spPr/>
+        <p:txBody>
+          <a:bodyPr/>
+          <a:lstStyle/>
+          <a:p>
+            <a:r>
+              <a:rPr lang="ru-RU" sz="1200" kern="1200" dirty="0" smtClean="0">
+                <a:solidFill>
+                  <a:schemeClr val="tx1"/>
+                </a:solidFill>
+                <a:effectLst/>
+                <a:latin typeface="+mn-lt"/>
+                <a:ea typeface="+mn-ea"/>
+                <a:cs typeface="+mn-cs"/>
+              </a:rPr>
+              <a:t>Таким образом, перейдем к последней стадии разработки, благодаря .</a:t>
+            </a:r>
+            <a:r>
+              <a:rPr lang="en-US" sz="1200" kern="1200" dirty="0" smtClean="0">
+                <a:solidFill>
+                  <a:schemeClr val="tx1"/>
+                </a:solidFill>
+                <a:effectLst/>
+                <a:latin typeface="+mn-lt"/>
+                <a:ea typeface="+mn-ea"/>
+                <a:cs typeface="+mn-cs"/>
+              </a:rPr>
+              <a:t>NET Core</a:t>
+            </a:r>
+            <a:r>
+              <a:rPr lang="ru-RU" sz="1200" kern="1200" dirty="0" smtClean="0">
+                <a:solidFill>
+                  <a:schemeClr val="tx1"/>
+                </a:solidFill>
+                <a:effectLst/>
+                <a:latin typeface="+mn-lt"/>
+                <a:ea typeface="+mn-ea"/>
+                <a:cs typeface="+mn-cs"/>
+              </a:rPr>
+              <a:t>, система работает как на системах </a:t>
+            </a:r>
+            <a:r>
+              <a:rPr lang="en-US" sz="1200" kern="1200" dirty="0" smtClean="0">
+                <a:solidFill>
+                  <a:schemeClr val="tx1"/>
+                </a:solidFill>
+                <a:effectLst/>
+                <a:latin typeface="+mn-lt"/>
+                <a:ea typeface="+mn-ea"/>
+                <a:cs typeface="+mn-cs"/>
+              </a:rPr>
+              <a:t>Windows</a:t>
+            </a:r>
+            <a:r>
+              <a:rPr lang="ru-RU" sz="1200" kern="1200" dirty="0" smtClean="0">
+                <a:solidFill>
+                  <a:schemeClr val="tx1"/>
+                </a:solidFill>
+                <a:effectLst/>
+                <a:latin typeface="+mn-lt"/>
+                <a:ea typeface="+mn-ea"/>
+                <a:cs typeface="+mn-cs"/>
+              </a:rPr>
+              <a:t>, так и на системах </a:t>
+            </a:r>
+            <a:r>
+              <a:rPr lang="en-US" sz="1200" kern="1200" dirty="0" smtClean="0">
+                <a:solidFill>
+                  <a:schemeClr val="tx1"/>
+                </a:solidFill>
+                <a:effectLst/>
+                <a:latin typeface="+mn-lt"/>
+                <a:ea typeface="+mn-ea"/>
+                <a:cs typeface="+mn-cs"/>
+              </a:rPr>
+              <a:t>Linux</a:t>
+            </a:r>
+            <a:r>
+              <a:rPr lang="ru-RU" sz="1200" kern="1200" dirty="0" smtClean="0">
+                <a:solidFill>
+                  <a:schemeClr val="tx1"/>
+                </a:solidFill>
+                <a:effectLst/>
+                <a:latin typeface="+mn-lt"/>
+                <a:ea typeface="+mn-ea"/>
+                <a:cs typeface="+mn-cs"/>
+              </a:rPr>
+              <a:t>. Фреймворк позволяет запускать </a:t>
+            </a:r>
+            <a:r>
+              <a:rPr lang="en-US" sz="1200" kern="1200" dirty="0" smtClean="0">
+                <a:solidFill>
+                  <a:schemeClr val="tx1"/>
+                </a:solidFill>
+                <a:effectLst/>
+                <a:latin typeface="+mn-lt"/>
+                <a:ea typeface="+mn-ea"/>
+                <a:cs typeface="+mn-cs"/>
+              </a:rPr>
+              <a:t>MPI </a:t>
+            </a:r>
+            <a:r>
+              <a:rPr lang="ru-RU" sz="1200" kern="1200" dirty="0" smtClean="0">
+                <a:solidFill>
+                  <a:schemeClr val="tx1"/>
+                </a:solidFill>
+                <a:effectLst/>
+                <a:latin typeface="+mn-lt"/>
+                <a:ea typeface="+mn-ea"/>
+                <a:cs typeface="+mn-cs"/>
+              </a:rPr>
+              <a:t>задачи, а также управлять выполнением запущенной программы. Таким образом, все поставленные задачи были выполненные, а заданная цель достигнута.</a:t>
+            </a:r>
+          </a:p>
+          <a:p>
+            <a:r>
+              <a:rPr lang="ru-RU" sz="1200" kern="1200" dirty="0" smtClean="0">
+                <a:solidFill>
+                  <a:schemeClr val="tx1"/>
+                </a:solidFill>
+                <a:effectLst/>
+                <a:latin typeface="+mn-lt"/>
+                <a:ea typeface="+mn-ea"/>
+                <a:cs typeface="+mn-cs"/>
+              </a:rPr>
+              <a:t>В дальнейшем планируется развитие продукта, создание веб клиента для управления. Также планируется добавление новой функциональности, </a:t>
+            </a:r>
+            <a:r>
+              <a:rPr lang="ru-RU" sz="1200" kern="1200" dirty="0" err="1" smtClean="0">
+                <a:solidFill>
+                  <a:schemeClr val="tx1"/>
+                </a:solidFill>
+                <a:effectLst/>
+                <a:latin typeface="+mn-lt"/>
+                <a:ea typeface="+mn-ea"/>
+                <a:cs typeface="+mn-cs"/>
+              </a:rPr>
+              <a:t>аткой</a:t>
+            </a:r>
+            <a:r>
+              <a:rPr lang="ru-RU" sz="1200" kern="1200" dirty="0" smtClean="0">
+                <a:solidFill>
+                  <a:schemeClr val="tx1"/>
+                </a:solidFill>
+                <a:effectLst/>
+                <a:latin typeface="+mn-lt"/>
+                <a:ea typeface="+mn-ea"/>
+                <a:cs typeface="+mn-cs"/>
+              </a:rPr>
+              <a:t> как получение статистики работы параллельной программы, работа через протокол </a:t>
+            </a:r>
+            <a:r>
+              <a:rPr lang="en-US" sz="1200" kern="1200" dirty="0" smtClean="0">
+                <a:solidFill>
+                  <a:schemeClr val="tx1"/>
+                </a:solidFill>
+                <a:effectLst/>
+                <a:latin typeface="+mn-lt"/>
+                <a:ea typeface="+mn-ea"/>
+                <a:cs typeface="+mn-cs"/>
+              </a:rPr>
+              <a:t>FTP</a:t>
+            </a:r>
+            <a:r>
+              <a:rPr lang="ru-RU" sz="1200" kern="1200" dirty="0" smtClean="0">
+                <a:solidFill>
+                  <a:schemeClr val="tx1"/>
+                </a:solidFill>
+                <a:effectLst/>
+                <a:latin typeface="+mn-lt"/>
+                <a:ea typeface="+mn-ea"/>
+                <a:cs typeface="+mn-cs"/>
+              </a:rPr>
+              <a:t>, запуск вычислений по определенному расписанию.</a:t>
+            </a:r>
+          </a:p>
+          <a:p>
+            <a:endParaRPr lang="ru-RU" dirty="0"/>
+          </a:p>
+        </p:txBody>
+      </p:sp>
+      <p:sp>
+        <p:nvSpPr>
+          <p:cNvPr id="4" name="Slide Number Placeholder 3"/>
+          <p:cNvSpPr>
+            <a:spLocks noGrp="1"/>
+          </p:cNvSpPr>
+          <p:nvPr>
+            <p:ph type="sldNum" sz="quarter" idx="10"/>
+          </p:nvPr>
+        </p:nvSpPr>
+        <p:spPr/>
+        <p:txBody>
+          <a:bodyPr/>
+          <a:lstStyle/>
+          <a:p>
+            <a:fld id="{F57A3BED-6B87-4A01-91AE-83340B7ECA5F}" type="slidenum">
+              <a:rPr lang="ru-RU" smtClean="0"/>
+              <a:t>9</a:t>
+            </a:fld>
+            <a:endParaRPr lang="ru-RU"/>
+          </a:p>
+        </p:txBody>
+      </p:sp>
+    </p:spTree>
+    <p:extLst>
+      <p:ext uri="{BB962C8B-B14F-4D97-AF65-F5344CB8AC3E}">
+        <p14:creationId xmlns:p14="http://schemas.microsoft.com/office/powerpoint/2010/main" val="1392149058"/>
       </p:ext>
     </p:extLst>
   </p:cSld>
@@ -746,7 +2700,7 @@
           <a:p>
             <a:fld id="{0570866F-3657-4C92-BF5C-DB442844A436}" type="datetime1">
               <a:rPr lang="en-US" smtClean="0"/>
-              <a:t>6/14/2017</a:t>
+              <a:t>6/20/2017</a:t>
             </a:fld>
             <a:endParaRPr lang="en-US" dirty="0"/>
           </a:p>
@@ -1080,7 +3034,7 @@
           <a:p>
             <a:fld id="{0A820E42-6EDB-4F60-B27F-1095566D2585}" type="datetime1">
               <a:rPr lang="en-US" smtClean="0"/>
-              <a:t>6/14/2017</a:t>
+              <a:t>6/20/2017</a:t>
             </a:fld>
             <a:endParaRPr lang="en-US" dirty="0"/>
           </a:p>
@@ -1477,7 +3431,7 @@
           <a:p>
             <a:fld id="{4B53F595-2520-4454-8606-FB5EDE23008C}" type="datetime1">
               <a:rPr lang="en-US" smtClean="0"/>
-              <a:t>6/14/2017</a:t>
+              <a:t>6/20/2017</a:t>
             </a:fld>
             <a:endParaRPr lang="en-US" dirty="0"/>
           </a:p>
@@ -1808,7 +3762,7 @@
           <a:p>
             <a:fld id="{4242B554-07A5-405D-8351-A3C24F0E5C1E}" type="datetime1">
               <a:rPr lang="en-US" smtClean="0"/>
-              <a:t>6/14/2017</a:t>
+              <a:t>6/20/2017</a:t>
             </a:fld>
             <a:endParaRPr lang="en-US" dirty="0"/>
           </a:p>
@@ -2124,7 +4078,7 @@
           <a:p>
             <a:fld id="{9564549F-DE2A-492A-B519-35D5B710A7D1}" type="datetime1">
               <a:rPr lang="en-US" smtClean="0"/>
-              <a:t>6/14/2017</a:t>
+              <a:t>6/20/2017</a:t>
             </a:fld>
             <a:endParaRPr lang="en-US" dirty="0"/>
           </a:p>
@@ -2516,7 +4470,7 @@
           <a:p>
             <a:fld id="{2C9FACB9-CCE3-4A20-9580-1400D5164890}" type="datetime1">
               <a:rPr lang="en-US" smtClean="0"/>
-              <a:t>6/14/2017</a:t>
+              <a:t>6/20/2017</a:t>
             </a:fld>
             <a:endParaRPr lang="en-US" dirty="0"/>
           </a:p>
@@ -2769,7 +4723,7 @@
           <a:p>
             <a:fld id="{40027895-2A1A-4573-A49C-34C673FC71C1}" type="datetime1">
               <a:rPr lang="en-US" smtClean="0"/>
-              <a:t>6/14/2017</a:t>
+              <a:t>6/20/2017</a:t>
             </a:fld>
             <a:endParaRPr lang="en-US" dirty="0"/>
           </a:p>
@@ -3027,7 +4981,7 @@
           <a:p>
             <a:fld id="{F0DBECF4-8A79-421F-97AC-B6415A08F1AD}" type="datetime1">
               <a:rPr lang="en-US" smtClean="0"/>
-              <a:t>6/14/2017</a:t>
+              <a:t>6/20/2017</a:t>
             </a:fld>
             <a:endParaRPr lang="en-US" dirty="0"/>
           </a:p>
@@ -3285,7 +5239,7 @@
           <a:p>
             <a:fld id="{08E027C0-F494-4CB3-A9E6-B017F2436109}" type="datetime1">
               <a:rPr lang="en-US" smtClean="0"/>
-              <a:t>6/14/2017</a:t>
+              <a:t>6/20/2017</a:t>
             </a:fld>
             <a:endParaRPr lang="en-US" dirty="0"/>
           </a:p>
@@ -3610,7 +5564,7 @@
           <a:p>
             <a:fld id="{05CC7835-4122-4D28-A992-AC61EBBC5ADC}" type="datetime1">
               <a:rPr lang="en-US" smtClean="0"/>
-              <a:t>6/14/2017</a:t>
+              <a:t>6/20/2017</a:t>
             </a:fld>
             <a:endParaRPr lang="en-US" dirty="0"/>
           </a:p>
@@ -3929,7 +5883,7 @@
           <a:p>
             <a:fld id="{B226077D-4E2D-41C1-B06F-54D12F868BF3}" type="datetime1">
               <a:rPr lang="en-US" smtClean="0"/>
-              <a:t>6/14/2017</a:t>
+              <a:t>6/20/2017</a:t>
             </a:fld>
             <a:endParaRPr lang="en-US" dirty="0"/>
           </a:p>
@@ -4382,7 +6336,7 @@
           <a:p>
             <a:fld id="{46B988C7-1FDE-40C0-B5C8-ECF7CBB4E810}" type="datetime1">
               <a:rPr lang="en-US" smtClean="0"/>
-              <a:t>6/14/2017</a:t>
+              <a:t>6/20/2017</a:t>
             </a:fld>
             <a:endParaRPr lang="en-US" dirty="0"/>
           </a:p>
@@ -4583,7 +6537,7 @@
           <a:p>
             <a:fld id="{7CA69BAE-4F5C-4629-AF26-5EE4C7818A53}" type="datetime1">
               <a:rPr lang="en-US" smtClean="0"/>
-              <a:t>6/14/2017</a:t>
+              <a:t>6/20/2017</a:t>
             </a:fld>
             <a:endParaRPr lang="en-US" dirty="0"/>
           </a:p>
@@ -4756,7 +6710,7 @@
           <a:p>
             <a:fld id="{0AFD6F3C-3C15-410B-98F0-2E7186B58D36}" type="datetime1">
               <a:rPr lang="en-US" smtClean="0"/>
-              <a:t>6/14/2017</a:t>
+              <a:t>6/20/2017</a:t>
             </a:fld>
             <a:endParaRPr lang="en-US" dirty="0"/>
           </a:p>
@@ -5085,7 +7039,7 @@
           <a:p>
             <a:fld id="{163E69F6-69B3-49DE-A734-D8F90E008C29}" type="datetime1">
               <a:rPr lang="en-US" smtClean="0"/>
-              <a:t>6/14/2017</a:t>
+              <a:t>6/20/2017</a:t>
             </a:fld>
             <a:endParaRPr lang="en-US" dirty="0"/>
           </a:p>
@@ -5426,7 +7380,7 @@
           <a:p>
             <a:fld id="{313C33B0-FC34-42D8-BD01-773D5AF233DC}" type="datetime1">
               <a:rPr lang="en-US" smtClean="0"/>
-              <a:t>6/14/2017</a:t>
+              <a:t>6/20/2017</a:t>
             </a:fld>
             <a:endParaRPr lang="en-US" dirty="0"/>
           </a:p>
@@ -7539,7 +9493,7 @@
           <a:p>
             <a:fld id="{1A595554-8E56-44A2-8860-CCC387A273C6}" type="datetime1">
               <a:rPr lang="en-US" smtClean="0"/>
-              <a:t>6/14/2017</a:t>
+              <a:t>6/20/2017</a:t>
             </a:fld>
             <a:endParaRPr lang="en-US" dirty="0"/>
           </a:p>
@@ -8781,6 +10735,13 @@
   <p:clrMapOvr>
     <a:masterClrMapping/>
   </p:clrMapOvr>
+  <p:timing>
+    <p:tnLst>
+      <p:par>
+        <p:cTn id="1" dur="indefinite" restart="never" nodeType="tmRoot"/>
+      </p:par>
+    </p:tnLst>
+  </p:timing>
 </p:sld>
 </file>
 
@@ -9042,11 +11003,7 @@
             <a:pPr lvl="0"/>
             <a:r>
               <a:rPr lang="ru-RU" sz="2000" dirty="0" smtClean="0"/>
-              <a:t>разработать серверную и клиентскую </a:t>
-            </a:r>
-            <a:r>
-              <a:rPr lang="ru-RU" sz="2000" dirty="0" smtClean="0"/>
-              <a:t>части</a:t>
+              <a:t>разработать серверную и клиентскую части</a:t>
             </a:r>
             <a:endParaRPr lang="ru-RU" sz="2000" dirty="0"/>
           </a:p>
@@ -9198,11 +11155,7 @@
           <a:p>
             <a:r>
               <a:rPr lang="en-US" sz="3000" dirty="0" smtClean="0"/>
-              <a:t>IBM Platform </a:t>
-            </a:r>
-            <a:r>
-              <a:rPr lang="en-US" sz="3000" dirty="0" smtClean="0"/>
-              <a:t>LSF</a:t>
+              <a:t>IBM Platform LSF</a:t>
             </a:r>
             <a:endParaRPr lang="en-US" sz="3000" dirty="0"/>
           </a:p>
@@ -9306,7 +11259,7 @@
           </p:nvPr>
         </p:nvPicPr>
         <p:blipFill rotWithShape="1">
-          <a:blip r:embed="rId2">
+          <a:blip r:embed="rId3">
             <a:extLst>
               <a:ext uri="{28A0092B-C50C-407E-A947-70E740481C1C}">
                 <a14:useLocalDpi xmlns:a14="http://schemas.microsoft.com/office/drawing/2010/main" val="0"/>
@@ -9434,7 +11387,7 @@
           </p:nvPr>
         </p:nvPicPr>
         <p:blipFill>
-          <a:blip r:embed="rId2">
+          <a:blip r:embed="rId3">
             <a:extLst>
               <a:ext uri="{28A0092B-C50C-407E-A947-70E740481C1C}">
                 <a14:useLocalDpi xmlns:a14="http://schemas.microsoft.com/office/drawing/2010/main" val="0"/>
@@ -9603,7 +11556,7 @@
           <p:nvPr/>
         </p:nvPicPr>
         <p:blipFill>
-          <a:blip r:embed="rId2">
+          <a:blip r:embed="rId3">
             <a:extLst>
               <a:ext uri="{28A0092B-C50C-407E-A947-70E740481C1C}">
                 <a14:useLocalDpi xmlns:a14="http://schemas.microsoft.com/office/drawing/2010/main" val="0"/>
@@ -9631,7 +11584,7 @@
           <p:nvPr/>
         </p:nvPicPr>
         <p:blipFill>
-          <a:blip r:embed="rId3"/>
+          <a:blip r:embed="rId4"/>
           <a:stretch>
             <a:fillRect/>
           </a:stretch>
@@ -9653,7 +11606,7 @@
           <p:nvPr/>
         </p:nvPicPr>
         <p:blipFill rotWithShape="1">
-          <a:blip r:embed="rId4"/>
+          <a:blip r:embed="rId5"/>
           <a:srcRect l="-224" t="23754" r="23938" b="1200"/>
           <a:stretch/>
         </p:blipFill>
@@ -9760,7 +11713,7 @@
           <p:nvPr/>
         </p:nvPicPr>
         <p:blipFill>
-          <a:blip r:embed="rId2">
+          <a:blip r:embed="rId3">
             <a:extLst>
               <a:ext uri="{28A0092B-C50C-407E-A947-70E740481C1C}">
                 <a14:useLocalDpi xmlns:a14="http://schemas.microsoft.com/office/drawing/2010/main" val="0"/>
@@ -9792,7 +11745,7 @@
           </p:nvPr>
         </p:nvPicPr>
         <p:blipFill>
-          <a:blip r:embed="rId3">
+          <a:blip r:embed="rId4">
             <a:extLst>
               <a:ext uri="{28A0092B-C50C-407E-A947-70E740481C1C}">
                 <a14:useLocalDpi xmlns:a14="http://schemas.microsoft.com/office/drawing/2010/main" val="0"/>

</xml_diff>